<commit_message>
Updated slides based on Mirjams suggestions
</commit_message>
<xml_diff>
--- a/part1/iderstudio.pptx
+++ b/part1/iderstudio.pptx
@@ -5,7 +5,7 @@
     <p:sldMasterId id="2147483648" r:id="rId1"/>
   </p:sldMasterIdLst>
   <p:sldIdLst>
-    <p:sldId id="256" r:id="rId2"/>
+    <p:sldId id="257" r:id="rId2"/>
   </p:sldIdLst>
   <p:sldSz cx="12192000" cy="6858000"/>
   <p:notesSz cx="6858000" cy="9144000"/>
@@ -272,7 +272,7 @@
           <a:p>
             <a:fld id="{3A4139E6-2962-FC40-BDEC-448850A9C1DD}" type="datetimeFigureOut">
               <a:rPr lang="en-NL" smtClean="0"/>
-              <a:t>28/08/2020</a:t>
+              <a:t>04/09/2020</a:t>
             </a:fld>
             <a:endParaRPr lang="en-NL"/>
           </a:p>
@@ -472,7 +472,7 @@
           <a:p>
             <a:fld id="{3A4139E6-2962-FC40-BDEC-448850A9C1DD}" type="datetimeFigureOut">
               <a:rPr lang="en-NL" smtClean="0"/>
-              <a:t>28/08/2020</a:t>
+              <a:t>04/09/2020</a:t>
             </a:fld>
             <a:endParaRPr lang="en-NL"/>
           </a:p>
@@ -682,7 +682,7 @@
           <a:p>
             <a:fld id="{3A4139E6-2962-FC40-BDEC-448850A9C1DD}" type="datetimeFigureOut">
               <a:rPr lang="en-NL" smtClean="0"/>
-              <a:t>28/08/2020</a:t>
+              <a:t>04/09/2020</a:t>
             </a:fld>
             <a:endParaRPr lang="en-NL"/>
           </a:p>
@@ -882,7 +882,7 @@
           <a:p>
             <a:fld id="{3A4139E6-2962-FC40-BDEC-448850A9C1DD}" type="datetimeFigureOut">
               <a:rPr lang="en-NL" smtClean="0"/>
-              <a:t>28/08/2020</a:t>
+              <a:t>04/09/2020</a:t>
             </a:fld>
             <a:endParaRPr lang="en-NL"/>
           </a:p>
@@ -1158,7 +1158,7 @@
           <a:p>
             <a:fld id="{3A4139E6-2962-FC40-BDEC-448850A9C1DD}" type="datetimeFigureOut">
               <a:rPr lang="en-NL" smtClean="0"/>
-              <a:t>28/08/2020</a:t>
+              <a:t>04/09/2020</a:t>
             </a:fld>
             <a:endParaRPr lang="en-NL"/>
           </a:p>
@@ -1426,7 +1426,7 @@
           <a:p>
             <a:fld id="{3A4139E6-2962-FC40-BDEC-448850A9C1DD}" type="datetimeFigureOut">
               <a:rPr lang="en-NL" smtClean="0"/>
-              <a:t>28/08/2020</a:t>
+              <a:t>04/09/2020</a:t>
             </a:fld>
             <a:endParaRPr lang="en-NL"/>
           </a:p>
@@ -1841,7 +1841,7 @@
           <a:p>
             <a:fld id="{3A4139E6-2962-FC40-BDEC-448850A9C1DD}" type="datetimeFigureOut">
               <a:rPr lang="en-NL" smtClean="0"/>
-              <a:t>28/08/2020</a:t>
+              <a:t>04/09/2020</a:t>
             </a:fld>
             <a:endParaRPr lang="en-NL"/>
           </a:p>
@@ -1983,7 +1983,7 @@
           <a:p>
             <a:fld id="{3A4139E6-2962-FC40-BDEC-448850A9C1DD}" type="datetimeFigureOut">
               <a:rPr lang="en-NL" smtClean="0"/>
-              <a:t>28/08/2020</a:t>
+              <a:t>04/09/2020</a:t>
             </a:fld>
             <a:endParaRPr lang="en-NL"/>
           </a:p>
@@ -2096,7 +2096,7 @@
           <a:p>
             <a:fld id="{3A4139E6-2962-FC40-BDEC-448850A9C1DD}" type="datetimeFigureOut">
               <a:rPr lang="en-NL" smtClean="0"/>
-              <a:t>28/08/2020</a:t>
+              <a:t>04/09/2020</a:t>
             </a:fld>
             <a:endParaRPr lang="en-NL"/>
           </a:p>
@@ -2409,7 +2409,7 @@
           <a:p>
             <a:fld id="{3A4139E6-2962-FC40-BDEC-448850A9C1DD}" type="datetimeFigureOut">
               <a:rPr lang="en-NL" smtClean="0"/>
-              <a:t>28/08/2020</a:t>
+              <a:t>04/09/2020</a:t>
             </a:fld>
             <a:endParaRPr lang="en-NL"/>
           </a:p>
@@ -2698,7 +2698,7 @@
           <a:p>
             <a:fld id="{3A4139E6-2962-FC40-BDEC-448850A9C1DD}" type="datetimeFigureOut">
               <a:rPr lang="en-NL" smtClean="0"/>
-              <a:t>28/08/2020</a:t>
+              <a:t>04/09/2020</a:t>
             </a:fld>
             <a:endParaRPr lang="en-NL"/>
           </a:p>
@@ -2941,7 +2941,7 @@
           <a:p>
             <a:fld id="{3A4139E6-2962-FC40-BDEC-448850A9C1DD}" type="datetimeFigureOut">
               <a:rPr lang="en-NL" smtClean="0"/>
-              <a:t>28/08/2020</a:t>
+              <a:t>04/09/2020</a:t>
             </a:fld>
             <a:endParaRPr lang="en-NL"/>
           </a:p>
@@ -3358,62 +3358,12 @@
           <a:chExt cx="0" cy="0"/>
         </a:xfrm>
       </p:grpSpPr>
-      <p:sp>
-        <p:nvSpPr>
-          <p:cNvPr id="2" name="Title 1">
-            <a:extLst>
-              <a:ext uri="{FF2B5EF4-FFF2-40B4-BE49-F238E27FC236}">
-                <a16:creationId xmlns:a16="http://schemas.microsoft.com/office/drawing/2014/main" id="{A006BE1E-19EC-5A40-A197-9AD5E73FBF49}"/>
-              </a:ext>
-            </a:extLst>
-          </p:cNvPr>
-          <p:cNvSpPr>
-            <a:spLocks noGrp="1"/>
-          </p:cNvSpPr>
-          <p:nvPr>
-            <p:ph type="ctrTitle"/>
-          </p:nvPr>
-        </p:nvSpPr>
-        <p:spPr/>
-        <p:txBody>
-          <a:bodyPr/>
-          <a:lstStyle/>
-          <a:p>
-            <a:endParaRPr lang="en-NL"/>
-          </a:p>
-        </p:txBody>
-      </p:sp>
-      <p:sp>
-        <p:nvSpPr>
-          <p:cNvPr id="3" name="Subtitle 2">
-            <a:extLst>
-              <a:ext uri="{FF2B5EF4-FFF2-40B4-BE49-F238E27FC236}">
-                <a16:creationId xmlns:a16="http://schemas.microsoft.com/office/drawing/2014/main" id="{30B0DA39-5F3D-CD49-A0A7-CB88E63F11E4}"/>
-              </a:ext>
-            </a:extLst>
-          </p:cNvPr>
-          <p:cNvSpPr>
-            <a:spLocks noGrp="1"/>
-          </p:cNvSpPr>
-          <p:nvPr>
-            <p:ph type="subTitle" idx="1"/>
-          </p:nvPr>
-        </p:nvSpPr>
-        <p:spPr/>
-        <p:txBody>
-          <a:bodyPr/>
-          <a:lstStyle/>
-          <a:p>
-            <a:endParaRPr lang="en-NL"/>
-          </a:p>
-        </p:txBody>
-      </p:sp>
       <p:pic>
         <p:nvPicPr>
-          <p:cNvPr id="5" name="Picture 4" descr="A screenshot of a social media post&#10;&#10;Description automatically generated">
-            <a:extLst>
-              <a:ext uri="{FF2B5EF4-FFF2-40B4-BE49-F238E27FC236}">
-                <a16:creationId xmlns:a16="http://schemas.microsoft.com/office/drawing/2014/main" id="{AC7E683D-50EB-C24A-9889-3F3534691A2E}"/>
+          <p:cNvPr id="6" name="Picture 5" descr="A screenshot of a computer screen&#10;&#10;Description automatically generated">
+            <a:extLst>
+              <a:ext uri="{FF2B5EF4-FFF2-40B4-BE49-F238E27FC236}">
+                <a16:creationId xmlns:a16="http://schemas.microsoft.com/office/drawing/2014/main" id="{C1F0BD89-3318-BC41-9B70-F8F23F054F35}"/>
               </a:ext>
             </a:extLst>
           </p:cNvPr>
@@ -3430,12 +3380,17 @@
         </p:blipFill>
         <p:spPr>
           <a:xfrm>
-            <a:off x="0" y="73025"/>
-            <a:ext cx="12192000" cy="6711950"/>
+            <a:off x="0" y="152918"/>
+            <a:ext cx="12192000" cy="6552163"/>
           </a:xfrm>
           <a:prstGeom prst="rect">
             <a:avLst/>
           </a:prstGeom>
+          <a:ln>
+            <a:solidFill>
+              <a:schemeClr val="accent5"/>
+            </a:solidFill>
+          </a:ln>
         </p:spPr>
       </p:pic>
       <p:cxnSp>
@@ -3455,15 +3410,15 @@
         </p:nvCxnSpPr>
         <p:spPr>
           <a:xfrm flipH="1" flipV="1">
-            <a:off x="9688286" y="573867"/>
-            <a:ext cx="749600" cy="969088"/>
+            <a:off x="9644743" y="517300"/>
+            <a:ext cx="612360" cy="1052092"/>
           </a:xfrm>
           <a:prstGeom prst="straightConnector1">
             <a:avLst/>
           </a:prstGeom>
           <a:ln w="19050">
             <a:solidFill>
-              <a:srgbClr val="C00000"/>
+              <a:schemeClr val="accent5"/>
             </a:solidFill>
             <a:tailEnd type="triangle"/>
           </a:ln>
@@ -3497,13 +3452,18 @@
         </p:nvSpPr>
         <p:spPr>
           <a:xfrm>
-            <a:off x="7673189" y="1600200"/>
-            <a:ext cx="855106" cy="276999"/>
+            <a:off x="7534359" y="1587825"/>
+            <a:ext cx="991362" cy="307777"/>
           </a:xfrm>
           <a:prstGeom prst="rect">
             <a:avLst/>
           </a:prstGeom>
           <a:noFill/>
+          <a:ln>
+            <a:solidFill>
+              <a:schemeClr val="accent5"/>
+            </a:solidFill>
+          </a:ln>
         </p:spPr>
         <p:txBody>
           <a:bodyPr wrap="none" rtlCol="0">
@@ -3512,16 +3472,16 @@
           <a:lstStyle/>
           <a:p>
             <a:r>
-              <a:rPr lang="en-NL" sz="1200" dirty="0">
+              <a:rPr lang="en-NL" sz="1400" dirty="0">
                 <a:solidFill>
-                  <a:srgbClr val="C00000"/>
+                  <a:srgbClr val="00B0F0"/>
                 </a:solidFill>
               </a:rPr>
-              <a:t>workspace</a:t>
-            </a:r>
-            <a:endParaRPr lang="en-NL" dirty="0">
+              <a:t>Workspace</a:t>
+            </a:r>
+            <a:endParaRPr lang="en-NL" sz="2000" dirty="0">
               <a:solidFill>
-                <a:srgbClr val="C00000"/>
+                <a:srgbClr val="00B0F0"/>
               </a:solidFill>
             </a:endParaRPr>
           </a:p>
@@ -3549,7 +3509,7 @@
           </a:prstGeom>
           <a:ln w="19050">
             <a:solidFill>
-              <a:srgbClr val="C00000"/>
+              <a:schemeClr val="accent5"/>
             </a:solidFill>
           </a:ln>
         </p:spPr>
@@ -3572,7 +3532,11 @@
           <a:lstStyle/>
           <a:p>
             <a:pPr algn="ctr"/>
-            <a:endParaRPr lang="en-NL"/>
+            <a:endParaRPr lang="en-NL" sz="2000">
+              <a:solidFill>
+                <a:srgbClr val="00B0F0"/>
+              </a:solidFill>
+            </a:endParaRPr>
           </a:p>
         </p:txBody>
       </p:sp>
@@ -3590,13 +3554,18 @@
         </p:nvSpPr>
         <p:spPr>
           <a:xfrm>
-            <a:off x="10437886" y="1312122"/>
-            <a:ext cx="1587871" cy="461665"/>
+            <a:off x="10257103" y="1307782"/>
+            <a:ext cx="1824410" cy="523220"/>
           </a:xfrm>
           <a:prstGeom prst="rect">
             <a:avLst/>
           </a:prstGeom>
           <a:noFill/>
+          <a:ln>
+            <a:solidFill>
+              <a:schemeClr val="accent5"/>
+            </a:solidFill>
+          </a:ln>
         </p:spPr>
         <p:txBody>
           <a:bodyPr wrap="none" rtlCol="0">
@@ -3605,19 +3574,19 @@
           <a:lstStyle/>
           <a:p>
             <a:r>
-              <a:rPr lang="en-NL" sz="1200" dirty="0">
+              <a:rPr lang="en-NL" sz="1400" dirty="0">
                 <a:solidFill>
-                  <a:srgbClr val="C00000"/>
+                  <a:srgbClr val="00B0F0"/>
                 </a:solidFill>
               </a:rPr>
-              <a:t>previous assignments/</a:t>
-            </a:r>
-          </a:p>
-          <a:p>
-            <a:r>
-              <a:rPr lang="en-NL" sz="1200" dirty="0">
+              <a:t>Previous assignments/</a:t>
+            </a:r>
+          </a:p>
+          <a:p>
+            <a:r>
+              <a:rPr lang="en-NL" sz="1400" dirty="0">
                 <a:solidFill>
-                  <a:srgbClr val="C00000"/>
+                  <a:srgbClr val="00B0F0"/>
                 </a:solidFill>
               </a:rPr>
               <a:t>commands</a:t>
@@ -3636,21 +3605,20 @@
           </p:cNvPr>
           <p:cNvCxnSpPr>
             <a:cxnSpLocks/>
-            <a:stCxn id="21" idx="1"/>
           </p:cNvCxnSpPr>
           <p:nvPr/>
         </p:nvCxnSpPr>
         <p:spPr>
           <a:xfrm flipH="1" flipV="1">
-            <a:off x="9122230" y="573870"/>
-            <a:ext cx="823350" cy="1630843"/>
+            <a:off x="9111920" y="411904"/>
+            <a:ext cx="833660" cy="1786647"/>
           </a:xfrm>
           <a:prstGeom prst="straightConnector1">
             <a:avLst/>
           </a:prstGeom>
           <a:ln w="19050">
             <a:solidFill>
-              <a:srgbClr val="C00000"/>
+              <a:schemeClr val="accent5"/>
             </a:solidFill>
             <a:tailEnd type="triangle"/>
           </a:ln>
@@ -3685,12 +3653,17 @@
         <p:spPr>
           <a:xfrm>
             <a:off x="9945580" y="1881547"/>
-            <a:ext cx="1587871" cy="646331"/>
+            <a:ext cx="1587871" cy="738664"/>
           </a:xfrm>
           <a:prstGeom prst="rect">
             <a:avLst/>
           </a:prstGeom>
           <a:noFill/>
+          <a:ln>
+            <a:solidFill>
+              <a:schemeClr val="accent5"/>
+            </a:solidFill>
+          </a:ln>
         </p:spPr>
         <p:txBody>
           <a:bodyPr wrap="square" rtlCol="0">
@@ -3699,19 +3672,19 @@
           <a:lstStyle/>
           <a:p>
             <a:r>
-              <a:rPr lang="en-NL" sz="1200" dirty="0">
+              <a:rPr lang="en-NL" sz="1400" dirty="0">
                 <a:solidFill>
-                  <a:srgbClr val="C00000"/>
+                  <a:srgbClr val="00B0F0"/>
                 </a:solidFill>
               </a:rPr>
-              <a:t>assigned variables,</a:t>
-            </a:r>
-          </a:p>
-          <a:p>
-            <a:r>
-              <a:rPr lang="en-GB" sz="1200" dirty="0">
+              <a:t>Assigned variables,</a:t>
+            </a:r>
+          </a:p>
+          <a:p>
+            <a:r>
+              <a:rPr lang="en-GB" sz="1400" dirty="0">
                 <a:solidFill>
-                  <a:srgbClr val="C00000"/>
+                  <a:srgbClr val="00B0F0"/>
                 </a:solidFill>
               </a:rPr>
               <a:t>loaded data-sets,</a:t>
@@ -3719,16 +3692,16 @@
           </a:p>
           <a:p>
             <a:r>
-              <a:rPr lang="en-GB" sz="1200" dirty="0">
+              <a:rPr lang="en-GB" sz="1400" dirty="0">
                 <a:solidFill>
-                  <a:srgbClr val="C00000"/>
+                  <a:srgbClr val="00B0F0"/>
                 </a:solidFill>
               </a:rPr>
               <a:t>…</a:t>
             </a:r>
-            <a:endParaRPr lang="en-NL" sz="1200" dirty="0">
+            <a:endParaRPr lang="en-NL" sz="1400" dirty="0">
               <a:solidFill>
-                <a:srgbClr val="C00000"/>
+                <a:srgbClr val="00B0F0"/>
               </a:solidFill>
             </a:endParaRPr>
           </a:p>
@@ -3749,12 +3722,17 @@
         <p:spPr>
           <a:xfrm>
             <a:off x="1150292" y="2510924"/>
-            <a:ext cx="2321469" cy="276999"/>
+            <a:ext cx="2680862" cy="307777"/>
           </a:xfrm>
           <a:prstGeom prst="rect">
             <a:avLst/>
           </a:prstGeom>
           <a:noFill/>
+          <a:ln>
+            <a:solidFill>
+              <a:schemeClr val="accent5"/>
+            </a:solidFill>
+          </a:ln>
         </p:spPr>
         <p:txBody>
           <a:bodyPr wrap="none" rtlCol="0">
@@ -3763,9 +3741,9 @@
           <a:lstStyle/>
           <a:p>
             <a:r>
-              <a:rPr lang="en-NL" sz="1200" dirty="0">
+              <a:rPr lang="en-NL" sz="1400" dirty="0">
                 <a:solidFill>
-                  <a:srgbClr val="C00000"/>
+                  <a:srgbClr val="00B0F0"/>
                 </a:solidFill>
               </a:rPr>
               <a:t>This is where you write your script</a:t>
@@ -3788,12 +3766,17 @@
         <p:spPr>
           <a:xfrm>
             <a:off x="1150292" y="5809862"/>
-            <a:ext cx="4823628" cy="276999"/>
+            <a:ext cx="5601855" cy="307777"/>
           </a:xfrm>
           <a:prstGeom prst="rect">
             <a:avLst/>
           </a:prstGeom>
           <a:noFill/>
+          <a:ln>
+            <a:solidFill>
+              <a:schemeClr val="accent5"/>
+            </a:solidFill>
+          </a:ln>
         </p:spPr>
         <p:txBody>
           <a:bodyPr wrap="none" rtlCol="0">
@@ -3802,9 +3785,9 @@
           <a:lstStyle/>
           <a:p>
             <a:r>
-              <a:rPr lang="en-NL" sz="1200" dirty="0">
+              <a:rPr lang="en-NL" sz="1400" dirty="0">
                 <a:solidFill>
-                  <a:srgbClr val="C00000"/>
+                  <a:srgbClr val="00B0F0"/>
                 </a:solidFill>
               </a:rPr>
               <a:t>This is where you can perform quick calculations, call variables, see output</a:t>
@@ -3829,15 +3812,15 @@
         </p:nvCxnSpPr>
         <p:spPr>
           <a:xfrm flipV="1">
-            <a:off x="5769830" y="696005"/>
-            <a:ext cx="1669875" cy="318025"/>
+            <a:off x="5769830" y="696006"/>
+            <a:ext cx="1669875" cy="318024"/>
           </a:xfrm>
           <a:prstGeom prst="straightConnector1">
             <a:avLst/>
           </a:prstGeom>
           <a:ln w="19050">
             <a:solidFill>
-              <a:srgbClr val="C00000"/>
+              <a:schemeClr val="accent5"/>
             </a:solidFill>
             <a:tailEnd type="triangle"/>
           </a:ln>
@@ -3872,12 +3855,17 @@
         <p:spPr>
           <a:xfrm>
             <a:off x="4975894" y="1014030"/>
-            <a:ext cx="1587871" cy="276999"/>
+            <a:ext cx="1587871" cy="307777"/>
           </a:xfrm>
           <a:prstGeom prst="rect">
             <a:avLst/>
           </a:prstGeom>
           <a:noFill/>
+          <a:ln>
+            <a:solidFill>
+              <a:schemeClr val="accent5"/>
+            </a:solidFill>
+          </a:ln>
         </p:spPr>
         <p:txBody>
           <a:bodyPr wrap="square" rtlCol="0">
@@ -3886,32 +3874,32 @@
           <a:lstStyle/>
           <a:p>
             <a:r>
-              <a:rPr lang="nl-NL" sz="1200" dirty="0">
+              <a:rPr lang="nl-NL" sz="1400" dirty="0">
                 <a:solidFill>
-                  <a:srgbClr val="C00000"/>
+                  <a:srgbClr val="00B0F0"/>
                 </a:solidFill>
               </a:rPr>
               <a:t>Run </a:t>
             </a:r>
             <a:r>
-              <a:rPr lang="nl-NL" sz="1200" dirty="0" err="1">
+              <a:rPr lang="nl-NL" sz="1400" dirty="0" err="1">
                 <a:solidFill>
-                  <a:srgbClr val="C00000"/>
+                  <a:srgbClr val="00B0F0"/>
                 </a:solidFill>
               </a:rPr>
               <a:t>your</a:t>
             </a:r>
             <a:r>
-              <a:rPr lang="nl-NL" sz="1200" dirty="0">
+              <a:rPr lang="nl-NL" sz="1400" dirty="0">
                 <a:solidFill>
-                  <a:srgbClr val="C00000"/>
+                  <a:srgbClr val="00B0F0"/>
                 </a:solidFill>
               </a:rPr>
               <a:t> code</a:t>
             </a:r>
-            <a:endParaRPr lang="en-NL" sz="1200" dirty="0">
+            <a:endParaRPr lang="en-NL" sz="1400" dirty="0">
               <a:solidFill>
-                <a:srgbClr val="C00000"/>
+                <a:srgbClr val="00B0F0"/>
               </a:solidFill>
             </a:endParaRPr>
           </a:p>
@@ -3933,15 +3921,15 @@
         </p:nvCxnSpPr>
         <p:spPr>
           <a:xfrm flipV="1">
-            <a:off x="7739743" y="2902163"/>
-            <a:ext cx="1115749" cy="1156293"/>
+            <a:off x="7739743" y="2799544"/>
+            <a:ext cx="1229899" cy="1258914"/>
           </a:xfrm>
           <a:prstGeom prst="straightConnector1">
             <a:avLst/>
           </a:prstGeom>
           <a:ln w="19050">
             <a:solidFill>
-              <a:srgbClr val="C00000"/>
+              <a:schemeClr val="accent5"/>
             </a:solidFill>
             <a:tailEnd type="triangle"/>
           </a:ln>
@@ -3976,12 +3964,17 @@
         <p:spPr>
           <a:xfrm>
             <a:off x="6961007" y="4058456"/>
-            <a:ext cx="1587871" cy="646331"/>
+            <a:ext cx="1587871" cy="738664"/>
           </a:xfrm>
           <a:prstGeom prst="rect">
             <a:avLst/>
           </a:prstGeom>
           <a:noFill/>
+          <a:ln>
+            <a:solidFill>
+              <a:schemeClr val="accent5"/>
+            </a:solidFill>
+          </a:ln>
         </p:spPr>
         <p:txBody>
           <a:bodyPr wrap="square" rtlCol="0">
@@ -3990,17 +3983,25 @@
           <a:lstStyle/>
           <a:p>
             <a:r>
-              <a:rPr lang="nl-NL" sz="1200" dirty="0" err="1">
+              <a:rPr lang="nl-NL" sz="1400" dirty="0">
                 <a:solidFill>
-                  <a:srgbClr val="C00000"/>
+                  <a:srgbClr val="00B0F0"/>
                 </a:solidFill>
               </a:rPr>
-              <a:t>working</a:t>
-            </a:r>
-            <a:r>
-              <a:rPr lang="nl-NL" sz="1200" dirty="0">
+              <a:t>W</a:t>
+            </a:r>
+            <a:r>
+              <a:rPr lang="nl-NL" sz="1400">
                 <a:solidFill>
-                  <a:srgbClr val="C00000"/>
+                  <a:srgbClr val="00B0F0"/>
+                </a:solidFill>
+              </a:rPr>
+              <a:t>orking</a:t>
+            </a:r>
+            <a:r>
+              <a:rPr lang="nl-NL" sz="1400" dirty="0">
+                <a:solidFill>
+                  <a:srgbClr val="00B0F0"/>
                 </a:solidFill>
               </a:rPr>
               <a:t> directory,</a:t>
@@ -4008,98 +4009,69 @@
           </a:p>
           <a:p>
             <a:r>
-              <a:rPr lang="nl-NL" sz="1200" dirty="0" err="1">
+              <a:rPr lang="nl-NL" sz="1400" dirty="0" err="1">
                 <a:solidFill>
-                  <a:srgbClr val="C00000"/>
+                  <a:srgbClr val="00B0F0"/>
                 </a:solidFill>
               </a:rPr>
               <a:t>and</a:t>
             </a:r>
             <a:r>
-              <a:rPr lang="nl-NL" sz="1200" dirty="0">
+              <a:rPr lang="nl-NL" sz="1400" dirty="0">
                 <a:solidFill>
-                  <a:srgbClr val="C00000"/>
+                  <a:srgbClr val="00B0F0"/>
                 </a:solidFill>
               </a:rPr>
               <a:t> </a:t>
             </a:r>
             <a:r>
-              <a:rPr lang="nl-NL" sz="1200" dirty="0" err="1">
+              <a:rPr lang="nl-NL" sz="1400" dirty="0" err="1">
                 <a:solidFill>
-                  <a:srgbClr val="C00000"/>
+                  <a:srgbClr val="00B0F0"/>
                 </a:solidFill>
               </a:rPr>
               <a:t>all</a:t>
             </a:r>
             <a:r>
-              <a:rPr lang="nl-NL" sz="1200" dirty="0">
+              <a:rPr lang="nl-NL" sz="1400" dirty="0">
                 <a:solidFill>
-                  <a:srgbClr val="C00000"/>
+                  <a:srgbClr val="00B0F0"/>
                 </a:solidFill>
               </a:rPr>
               <a:t> files </a:t>
             </a:r>
             <a:r>
-              <a:rPr lang="nl-NL" sz="1200" dirty="0" err="1">
+              <a:rPr lang="nl-NL" sz="1400" dirty="0" err="1">
                 <a:solidFill>
-                  <a:srgbClr val="C00000"/>
+                  <a:srgbClr val="00B0F0"/>
                 </a:solidFill>
               </a:rPr>
               <a:t>contained</a:t>
             </a:r>
             <a:r>
-              <a:rPr lang="nl-NL" sz="1200" dirty="0">
+              <a:rPr lang="nl-NL" sz="1400" dirty="0">
                 <a:solidFill>
-                  <a:srgbClr val="C00000"/>
+                  <a:srgbClr val="00B0F0"/>
                 </a:solidFill>
               </a:rPr>
               <a:t> in </a:t>
             </a:r>
             <a:r>
-              <a:rPr lang="nl-NL" sz="1200" dirty="0" err="1">
+              <a:rPr lang="nl-NL" sz="1400" dirty="0" err="1">
                 <a:solidFill>
-                  <a:srgbClr val="C00000"/>
+                  <a:srgbClr val="00B0F0"/>
                 </a:solidFill>
               </a:rPr>
               <a:t>that</a:t>
             </a:r>
-            <a:endParaRPr lang="en-NL" sz="1200" dirty="0">
+            <a:endParaRPr lang="en-NL" sz="1400" dirty="0">
               <a:solidFill>
-                <a:srgbClr val="C00000"/>
+                <a:srgbClr val="00B0F0"/>
               </a:solidFill>
             </a:endParaRPr>
           </a:p>
         </p:txBody>
       </p:sp>
-      <p:pic>
-        <p:nvPicPr>
-          <p:cNvPr id="44" name="Picture 43" descr="A screenshot of a social media post&#10;&#10;Description automatically generated">
-            <a:extLst>
-              <a:ext uri="{FF2B5EF4-FFF2-40B4-BE49-F238E27FC236}">
-                <a16:creationId xmlns:a16="http://schemas.microsoft.com/office/drawing/2014/main" id="{8B8A75DB-1817-3644-94F7-4844E69FF0C8}"/>
-              </a:ext>
-            </a:extLst>
-          </p:cNvPr>
-          <p:cNvPicPr>
-            <a:picLocks noChangeAspect="1"/>
-          </p:cNvPicPr>
-          <p:nvPr/>
-        </p:nvPicPr>
-        <p:blipFill rotWithShape="1">
-          <a:blip r:embed="rId2"/>
-          <a:srcRect l="8185" t="13363" r="68131" b="37620"/>
-          <a:stretch/>
-        </p:blipFill>
-        <p:spPr>
-          <a:xfrm>
-            <a:off x="8855492" y="3322755"/>
-            <a:ext cx="3170265" cy="3411077"/>
-          </a:xfrm>
-          <a:prstGeom prst="rect">
-            <a:avLst/>
-          </a:prstGeom>
-        </p:spPr>
-      </p:pic>
       <p:cxnSp>
         <p:nvCxnSpPr>
           <p:cNvPr id="28" name="Straight Arrow Connector 27">
@@ -4118,14 +4090,14 @@
         <p:spPr>
           <a:xfrm flipH="1" flipV="1">
             <a:off x="9720943" y="2827710"/>
-            <a:ext cx="823350" cy="1446176"/>
+            <a:ext cx="823350" cy="1461565"/>
           </a:xfrm>
           <a:prstGeom prst="straightConnector1">
             <a:avLst/>
           </a:prstGeom>
           <a:ln w="19050">
             <a:solidFill>
-              <a:srgbClr val="C00000"/>
+              <a:schemeClr val="accent5"/>
             </a:solidFill>
             <a:tailEnd type="triangle"/>
           </a:ln>
@@ -4160,12 +4132,17 @@
         <p:spPr>
           <a:xfrm>
             <a:off x="10544293" y="4135386"/>
-            <a:ext cx="1587871" cy="276999"/>
+            <a:ext cx="1587871" cy="307777"/>
           </a:xfrm>
           <a:prstGeom prst="rect">
             <a:avLst/>
           </a:prstGeom>
           <a:noFill/>
+          <a:ln>
+            <a:solidFill>
+              <a:schemeClr val="accent5"/>
+            </a:solidFill>
+          </a:ln>
         </p:spPr>
         <p:txBody>
           <a:bodyPr wrap="square" rtlCol="0">
@@ -4174,24 +4151,24 @@
           <a:lstStyle/>
           <a:p>
             <a:r>
-              <a:rPr lang="nl-NL" sz="1200" dirty="0" err="1">
+              <a:rPr lang="nl-NL" sz="1400" dirty="0" err="1">
                 <a:solidFill>
-                  <a:srgbClr val="C00000"/>
+                  <a:srgbClr val="00B0F0"/>
                 </a:solidFill>
               </a:rPr>
-              <a:t>installed</a:t>
-            </a:r>
-            <a:r>
-              <a:rPr lang="nl-NL" sz="1200" dirty="0">
+              <a:t>Installed</a:t>
+            </a:r>
+            <a:r>
+              <a:rPr lang="nl-NL" sz="1400" dirty="0">
                 <a:solidFill>
-                  <a:srgbClr val="C00000"/>
+                  <a:srgbClr val="00B0F0"/>
                 </a:solidFill>
               </a:rPr>
               <a:t> packages</a:t>
             </a:r>
-            <a:endParaRPr lang="en-NL" sz="1200" dirty="0">
+            <a:endParaRPr lang="en-NL" sz="1400" dirty="0">
               <a:solidFill>
-                <a:srgbClr val="C00000"/>
+                <a:srgbClr val="00B0F0"/>
               </a:solidFill>
             </a:endParaRPr>
           </a:p>
@@ -4222,7 +4199,7 @@
           </a:prstGeom>
           <a:ln w="19050">
             <a:solidFill>
-              <a:srgbClr val="C00000"/>
+              <a:schemeClr val="accent5"/>
             </a:solidFill>
             <a:tailEnd type="triangle"/>
           </a:ln>
@@ -4257,12 +4234,17 @@
         <p:spPr>
           <a:xfrm>
             <a:off x="548099" y="1225972"/>
-            <a:ext cx="1587871" cy="1015663"/>
+            <a:ext cx="1587871" cy="1169551"/>
           </a:xfrm>
           <a:prstGeom prst="rect">
             <a:avLst/>
           </a:prstGeom>
           <a:noFill/>
+          <a:ln>
+            <a:solidFill>
+              <a:schemeClr val="accent5"/>
+            </a:solidFill>
+          </a:ln>
         </p:spPr>
         <p:txBody>
           <a:bodyPr wrap="square" rtlCol="0">
@@ -4271,9 +4253,9 @@
           <a:lstStyle/>
           <a:p>
             <a:r>
-              <a:rPr lang="nl-NL" sz="1200" dirty="0">
+              <a:rPr lang="nl-NL" sz="1400" dirty="0">
                 <a:solidFill>
-                  <a:srgbClr val="C00000"/>
+                  <a:srgbClr val="00B0F0"/>
                 </a:solidFill>
               </a:rPr>
               <a:t>Open a new:</a:t>
@@ -4281,9 +4263,9 @@
           </a:p>
           <a:p>
             <a:r>
-              <a:rPr lang="nl-NL" sz="1200" dirty="0">
+              <a:rPr lang="nl-NL" sz="1400" dirty="0">
                 <a:solidFill>
-                  <a:srgbClr val="C00000"/>
+                  <a:srgbClr val="00B0F0"/>
                 </a:solidFill>
               </a:rPr>
               <a:t>script</a:t>
@@ -4291,39 +4273,39 @@
           </a:p>
           <a:p>
             <a:r>
-              <a:rPr lang="nl-NL" sz="1200" dirty="0" err="1">
+              <a:rPr lang="nl-NL" sz="1400" dirty="0" err="1">
                 <a:solidFill>
-                  <a:srgbClr val="C00000"/>
+                  <a:srgbClr val="00B0F0"/>
                 </a:solidFill>
               </a:rPr>
               <a:t>Rmarkdown</a:t>
             </a:r>
-            <a:endParaRPr lang="nl-NL" sz="1200" dirty="0">
+            <a:endParaRPr lang="nl-NL" sz="1400" dirty="0">
               <a:solidFill>
-                <a:srgbClr val="C00000"/>
+                <a:srgbClr val="00B0F0"/>
               </a:solidFill>
             </a:endParaRPr>
           </a:p>
           <a:p>
             <a:r>
-              <a:rPr lang="nl-NL" sz="1200" dirty="0" err="1">
+              <a:rPr lang="nl-NL" sz="1400" dirty="0" err="1">
                 <a:solidFill>
-                  <a:srgbClr val="C00000"/>
+                  <a:srgbClr val="00B0F0"/>
                 </a:solidFill>
               </a:rPr>
               <a:t>Rpresentation</a:t>
             </a:r>
-            <a:endParaRPr lang="nl-NL" sz="1200" dirty="0">
+            <a:endParaRPr lang="nl-NL" sz="1400" dirty="0">
               <a:solidFill>
-                <a:srgbClr val="C00000"/>
+                <a:srgbClr val="00B0F0"/>
               </a:solidFill>
             </a:endParaRPr>
           </a:p>
           <a:p>
             <a:r>
-              <a:rPr lang="nl-NL" sz="1200" dirty="0">
+              <a:rPr lang="nl-NL" sz="1400" dirty="0">
                 <a:solidFill>
-                  <a:srgbClr val="C00000"/>
+                  <a:srgbClr val="00B0F0"/>
                 </a:solidFill>
               </a:rPr>
               <a:t>…</a:t>
@@ -4334,7 +4316,7 @@
     </p:spTree>
     <p:extLst>
       <p:ext uri="{BB962C8B-B14F-4D97-AF65-F5344CB8AC3E}">
-        <p14:creationId xmlns:p14="http://schemas.microsoft.com/office/powerpoint/2010/main" val="94297568"/>
+        <p14:creationId xmlns:p14="http://schemas.microsoft.com/office/powerpoint/2010/main" val="3018211215"/>
       </p:ext>
     </p:extLst>
   </p:cSld>

</xml_diff>

<commit_message>
corrected slided, created exercises and solutions
</commit_message>
<xml_diff>
--- a/part1/iderstudio.pptx
+++ b/part1/iderstudio.pptx
@@ -272,7 +272,7 @@
           <a:p>
             <a:fld id="{3A4139E6-2962-FC40-BDEC-448850A9C1DD}" type="datetimeFigureOut">
               <a:rPr lang="en-NL" smtClean="0"/>
-              <a:t>04/09/2020</a:t>
+              <a:t>08/09/2020</a:t>
             </a:fld>
             <a:endParaRPr lang="en-NL"/>
           </a:p>
@@ -472,7 +472,7 @@
           <a:p>
             <a:fld id="{3A4139E6-2962-FC40-BDEC-448850A9C1DD}" type="datetimeFigureOut">
               <a:rPr lang="en-NL" smtClean="0"/>
-              <a:t>04/09/2020</a:t>
+              <a:t>08/09/2020</a:t>
             </a:fld>
             <a:endParaRPr lang="en-NL"/>
           </a:p>
@@ -682,7 +682,7 @@
           <a:p>
             <a:fld id="{3A4139E6-2962-FC40-BDEC-448850A9C1DD}" type="datetimeFigureOut">
               <a:rPr lang="en-NL" smtClean="0"/>
-              <a:t>04/09/2020</a:t>
+              <a:t>08/09/2020</a:t>
             </a:fld>
             <a:endParaRPr lang="en-NL"/>
           </a:p>
@@ -882,7 +882,7 @@
           <a:p>
             <a:fld id="{3A4139E6-2962-FC40-BDEC-448850A9C1DD}" type="datetimeFigureOut">
               <a:rPr lang="en-NL" smtClean="0"/>
-              <a:t>04/09/2020</a:t>
+              <a:t>08/09/2020</a:t>
             </a:fld>
             <a:endParaRPr lang="en-NL"/>
           </a:p>
@@ -1158,7 +1158,7 @@
           <a:p>
             <a:fld id="{3A4139E6-2962-FC40-BDEC-448850A9C1DD}" type="datetimeFigureOut">
               <a:rPr lang="en-NL" smtClean="0"/>
-              <a:t>04/09/2020</a:t>
+              <a:t>08/09/2020</a:t>
             </a:fld>
             <a:endParaRPr lang="en-NL"/>
           </a:p>
@@ -1426,7 +1426,7 @@
           <a:p>
             <a:fld id="{3A4139E6-2962-FC40-BDEC-448850A9C1DD}" type="datetimeFigureOut">
               <a:rPr lang="en-NL" smtClean="0"/>
-              <a:t>04/09/2020</a:t>
+              <a:t>08/09/2020</a:t>
             </a:fld>
             <a:endParaRPr lang="en-NL"/>
           </a:p>
@@ -1841,7 +1841,7 @@
           <a:p>
             <a:fld id="{3A4139E6-2962-FC40-BDEC-448850A9C1DD}" type="datetimeFigureOut">
               <a:rPr lang="en-NL" smtClean="0"/>
-              <a:t>04/09/2020</a:t>
+              <a:t>08/09/2020</a:t>
             </a:fld>
             <a:endParaRPr lang="en-NL"/>
           </a:p>
@@ -1983,7 +1983,7 @@
           <a:p>
             <a:fld id="{3A4139E6-2962-FC40-BDEC-448850A9C1DD}" type="datetimeFigureOut">
               <a:rPr lang="en-NL" smtClean="0"/>
-              <a:t>04/09/2020</a:t>
+              <a:t>08/09/2020</a:t>
             </a:fld>
             <a:endParaRPr lang="en-NL"/>
           </a:p>
@@ -2096,7 +2096,7 @@
           <a:p>
             <a:fld id="{3A4139E6-2962-FC40-BDEC-448850A9C1DD}" type="datetimeFigureOut">
               <a:rPr lang="en-NL" smtClean="0"/>
-              <a:t>04/09/2020</a:t>
+              <a:t>08/09/2020</a:t>
             </a:fld>
             <a:endParaRPr lang="en-NL"/>
           </a:p>
@@ -2409,7 +2409,7 @@
           <a:p>
             <a:fld id="{3A4139E6-2962-FC40-BDEC-448850A9C1DD}" type="datetimeFigureOut">
               <a:rPr lang="en-NL" smtClean="0"/>
-              <a:t>04/09/2020</a:t>
+              <a:t>08/09/2020</a:t>
             </a:fld>
             <a:endParaRPr lang="en-NL"/>
           </a:p>
@@ -2698,7 +2698,7 @@
           <a:p>
             <a:fld id="{3A4139E6-2962-FC40-BDEC-448850A9C1DD}" type="datetimeFigureOut">
               <a:rPr lang="en-NL" smtClean="0"/>
-              <a:t>04/09/2020</a:t>
+              <a:t>08/09/2020</a:t>
             </a:fld>
             <a:endParaRPr lang="en-NL"/>
           </a:p>
@@ -2941,7 +2941,7 @@
           <a:p>
             <a:fld id="{3A4139E6-2962-FC40-BDEC-448850A9C1DD}" type="datetimeFigureOut">
               <a:rPr lang="en-NL" smtClean="0"/>
-              <a:t>04/09/2020</a:t>
+              <a:t>08/09/2020</a:t>
             </a:fld>
             <a:endParaRPr lang="en-NL"/>
           </a:p>
@@ -3360,10 +3360,10 @@
       </p:grpSpPr>
       <p:pic>
         <p:nvPicPr>
-          <p:cNvPr id="6" name="Picture 5" descr="A screenshot of a computer screen&#10;&#10;Description automatically generated">
-            <a:extLst>
-              <a:ext uri="{FF2B5EF4-FFF2-40B4-BE49-F238E27FC236}">
-                <a16:creationId xmlns:a16="http://schemas.microsoft.com/office/drawing/2014/main" id="{C1F0BD89-3318-BC41-9B70-F8F23F054F35}"/>
+          <p:cNvPr id="3" name="Picture 2" descr="A screenshot of a social media post&#10;&#10;Description automatically generated">
+            <a:extLst>
+              <a:ext uri="{FF2B5EF4-FFF2-40B4-BE49-F238E27FC236}">
+                <a16:creationId xmlns:a16="http://schemas.microsoft.com/office/drawing/2014/main" id="{851D6E7B-447B-0846-8841-E4372685B707}"/>
               </a:ext>
             </a:extLst>
           </p:cNvPr>
@@ -3380,17 +3380,12 @@
         </p:blipFill>
         <p:spPr>
           <a:xfrm>
-            <a:off x="0" y="152918"/>
-            <a:ext cx="12192000" cy="6552163"/>
+            <a:off x="0" y="74453"/>
+            <a:ext cx="12192000" cy="6709094"/>
           </a:xfrm>
           <a:prstGeom prst="rect">
             <a:avLst/>
           </a:prstGeom>
-          <a:ln>
-            <a:solidFill>
-              <a:schemeClr val="accent5"/>
-            </a:solidFill>
-          </a:ln>
         </p:spPr>
       </p:pic>
       <p:cxnSp>
@@ -3418,7 +3413,7 @@
           </a:prstGeom>
           <a:ln w="19050">
             <a:solidFill>
-              <a:schemeClr val="accent5"/>
+              <a:srgbClr val="C00000"/>
             </a:solidFill>
             <a:tailEnd type="triangle"/>
           </a:ln>
@@ -3461,7 +3456,7 @@
           <a:noFill/>
           <a:ln>
             <a:solidFill>
-              <a:schemeClr val="accent5"/>
+              <a:srgbClr val="C00000"/>
             </a:solidFill>
           </a:ln>
         </p:spPr>
@@ -3474,14 +3469,14 @@
             <a:r>
               <a:rPr lang="en-NL" sz="1400" dirty="0">
                 <a:solidFill>
-                  <a:srgbClr val="00B0F0"/>
+                  <a:srgbClr val="FF0000"/>
                 </a:solidFill>
               </a:rPr>
               <a:t>Workspace</a:t>
             </a:r>
             <a:endParaRPr lang="en-NL" sz="2000" dirty="0">
               <a:solidFill>
-                <a:srgbClr val="00B0F0"/>
+                <a:srgbClr val="FF0000"/>
               </a:solidFill>
             </a:endParaRPr>
           </a:p>
@@ -3509,7 +3504,7 @@
           </a:prstGeom>
           <a:ln w="19050">
             <a:solidFill>
-              <a:schemeClr val="accent5"/>
+              <a:srgbClr val="C00000"/>
             </a:solidFill>
           </a:ln>
         </p:spPr>
@@ -3534,7 +3529,7 @@
             <a:pPr algn="ctr"/>
             <a:endParaRPr lang="en-NL" sz="2000">
               <a:solidFill>
-                <a:srgbClr val="00B0F0"/>
+                <a:srgbClr val="FF0000"/>
               </a:solidFill>
             </a:endParaRPr>
           </a:p>
@@ -3563,7 +3558,7 @@
           <a:noFill/>
           <a:ln>
             <a:solidFill>
-              <a:schemeClr val="accent5"/>
+              <a:srgbClr val="C00000"/>
             </a:solidFill>
           </a:ln>
         </p:spPr>
@@ -3576,7 +3571,7 @@
             <a:r>
               <a:rPr lang="en-NL" sz="1400" dirty="0">
                 <a:solidFill>
-                  <a:srgbClr val="00B0F0"/>
+                  <a:srgbClr val="FF0000"/>
                 </a:solidFill>
               </a:rPr>
               <a:t>Previous assignments/</a:t>
@@ -3586,7 +3581,7 @@
             <a:r>
               <a:rPr lang="en-NL" sz="1400" dirty="0">
                 <a:solidFill>
-                  <a:srgbClr val="00B0F0"/>
+                  <a:srgbClr val="FF0000"/>
                 </a:solidFill>
               </a:rPr>
               <a:t>commands</a:t>
@@ -3610,15 +3605,15 @@
         </p:nvCxnSpPr>
         <p:spPr>
           <a:xfrm flipH="1" flipV="1">
-            <a:off x="9111920" y="411904"/>
-            <a:ext cx="833660" cy="1786647"/>
+            <a:off x="9184341" y="517300"/>
+            <a:ext cx="761239" cy="1681252"/>
           </a:xfrm>
           <a:prstGeom prst="straightConnector1">
             <a:avLst/>
           </a:prstGeom>
           <a:ln w="19050">
             <a:solidFill>
-              <a:schemeClr val="accent5"/>
+              <a:srgbClr val="C00000"/>
             </a:solidFill>
             <a:tailEnd type="triangle"/>
           </a:ln>
@@ -3661,7 +3656,7 @@
           <a:noFill/>
           <a:ln>
             <a:solidFill>
-              <a:schemeClr val="accent5"/>
+              <a:srgbClr val="C00000"/>
             </a:solidFill>
           </a:ln>
         </p:spPr>
@@ -3674,7 +3669,7 @@
             <a:r>
               <a:rPr lang="en-NL" sz="1400" dirty="0">
                 <a:solidFill>
-                  <a:srgbClr val="00B0F0"/>
+                  <a:srgbClr val="FF0000"/>
                 </a:solidFill>
               </a:rPr>
               <a:t>Assigned variables,</a:t>
@@ -3684,7 +3679,7 @@
             <a:r>
               <a:rPr lang="en-GB" sz="1400" dirty="0">
                 <a:solidFill>
-                  <a:srgbClr val="00B0F0"/>
+                  <a:srgbClr val="FF0000"/>
                 </a:solidFill>
               </a:rPr>
               <a:t>loaded data-sets,</a:t>
@@ -3694,14 +3689,14 @@
             <a:r>
               <a:rPr lang="en-GB" sz="1400" dirty="0">
                 <a:solidFill>
-                  <a:srgbClr val="00B0F0"/>
+                  <a:srgbClr val="FF0000"/>
                 </a:solidFill>
               </a:rPr>
               <a:t>…</a:t>
             </a:r>
             <a:endParaRPr lang="en-NL" sz="1400" dirty="0">
               <a:solidFill>
-                <a:srgbClr val="00B0F0"/>
+                <a:srgbClr val="FF0000"/>
               </a:solidFill>
             </a:endParaRPr>
           </a:p>
@@ -3730,7 +3725,7 @@
           <a:noFill/>
           <a:ln>
             <a:solidFill>
-              <a:schemeClr val="accent5"/>
+              <a:srgbClr val="C00000"/>
             </a:solidFill>
           </a:ln>
         </p:spPr>
@@ -3743,7 +3738,7 @@
             <a:r>
               <a:rPr lang="en-NL" sz="1400" dirty="0">
                 <a:solidFill>
-                  <a:srgbClr val="00B0F0"/>
+                  <a:srgbClr val="FF0000"/>
                 </a:solidFill>
               </a:rPr>
               <a:t>This is where you write your script</a:t>
@@ -3774,7 +3769,7 @@
           <a:noFill/>
           <a:ln>
             <a:solidFill>
-              <a:schemeClr val="accent5"/>
+              <a:srgbClr val="C00000"/>
             </a:solidFill>
           </a:ln>
         </p:spPr>
@@ -3787,7 +3782,7 @@
             <a:r>
               <a:rPr lang="en-NL" sz="1400" dirty="0">
                 <a:solidFill>
-                  <a:srgbClr val="00B0F0"/>
+                  <a:srgbClr val="FF0000"/>
                 </a:solidFill>
               </a:rPr>
               <a:t>This is where you can perform quick calculations, call variables, see output</a:t>
@@ -3820,7 +3815,7 @@
           </a:prstGeom>
           <a:ln w="19050">
             <a:solidFill>
-              <a:schemeClr val="accent5"/>
+              <a:srgbClr val="C00000"/>
             </a:solidFill>
             <a:tailEnd type="triangle"/>
           </a:ln>
@@ -3863,7 +3858,7 @@
           <a:noFill/>
           <a:ln>
             <a:solidFill>
-              <a:schemeClr val="accent5"/>
+              <a:srgbClr val="C00000"/>
             </a:solidFill>
           </a:ln>
         </p:spPr>
@@ -3876,7 +3871,7 @@
             <a:r>
               <a:rPr lang="nl-NL" sz="1400" dirty="0">
                 <a:solidFill>
-                  <a:srgbClr val="00B0F0"/>
+                  <a:srgbClr val="FF0000"/>
                 </a:solidFill>
               </a:rPr>
               <a:t>Run </a:t>
@@ -3884,7 +3879,7 @@
             <a:r>
               <a:rPr lang="nl-NL" sz="1400" dirty="0" err="1">
                 <a:solidFill>
-                  <a:srgbClr val="00B0F0"/>
+                  <a:srgbClr val="FF0000"/>
                 </a:solidFill>
               </a:rPr>
               <a:t>your</a:t>
@@ -3892,14 +3887,14 @@
             <a:r>
               <a:rPr lang="nl-NL" sz="1400" dirty="0">
                 <a:solidFill>
-                  <a:srgbClr val="00B0F0"/>
+                  <a:srgbClr val="FF0000"/>
                 </a:solidFill>
               </a:rPr>
               <a:t> code</a:t>
             </a:r>
             <a:endParaRPr lang="en-NL" sz="1400" dirty="0">
               <a:solidFill>
-                <a:srgbClr val="00B0F0"/>
+                <a:srgbClr val="FF0000"/>
               </a:solidFill>
             </a:endParaRPr>
           </a:p>
@@ -3929,7 +3924,7 @@
           </a:prstGeom>
           <a:ln w="19050">
             <a:solidFill>
-              <a:schemeClr val="accent5"/>
+              <a:srgbClr val="C00000"/>
             </a:solidFill>
             <a:tailEnd type="triangle"/>
           </a:ln>
@@ -3972,7 +3967,7 @@
           <a:noFill/>
           <a:ln>
             <a:solidFill>
-              <a:schemeClr val="accent5"/>
+              <a:srgbClr val="C00000"/>
             </a:solidFill>
           </a:ln>
         </p:spPr>
@@ -3985,7 +3980,7 @@
             <a:r>
               <a:rPr lang="nl-NL" sz="1400" dirty="0">
                 <a:solidFill>
-                  <a:srgbClr val="00B0F0"/>
+                  <a:srgbClr val="FF0000"/>
                 </a:solidFill>
               </a:rPr>
               <a:t>W</a:t>
@@ -3993,7 +3988,7 @@
             <a:r>
               <a:rPr lang="nl-NL" sz="1400">
                 <a:solidFill>
-                  <a:srgbClr val="00B0F0"/>
+                  <a:srgbClr val="FF0000"/>
                 </a:solidFill>
               </a:rPr>
               <a:t>orking</a:t>
@@ -4001,7 +3996,7 @@
             <a:r>
               <a:rPr lang="nl-NL" sz="1400" dirty="0">
                 <a:solidFill>
-                  <a:srgbClr val="00B0F0"/>
+                  <a:srgbClr val="FF0000"/>
                 </a:solidFill>
               </a:rPr>
               <a:t> directory,</a:t>
@@ -4011,7 +4006,7 @@
             <a:r>
               <a:rPr lang="nl-NL" sz="1400" dirty="0" err="1">
                 <a:solidFill>
-                  <a:srgbClr val="00B0F0"/>
+                  <a:srgbClr val="FF0000"/>
                 </a:solidFill>
               </a:rPr>
               <a:t>and</a:t>
@@ -4019,7 +4014,7 @@
             <a:r>
               <a:rPr lang="nl-NL" sz="1400" dirty="0">
                 <a:solidFill>
-                  <a:srgbClr val="00B0F0"/>
+                  <a:srgbClr val="FF0000"/>
                 </a:solidFill>
               </a:rPr>
               <a:t> </a:t>
@@ -4027,7 +4022,7 @@
             <a:r>
               <a:rPr lang="nl-NL" sz="1400" dirty="0" err="1">
                 <a:solidFill>
-                  <a:srgbClr val="00B0F0"/>
+                  <a:srgbClr val="FF0000"/>
                 </a:solidFill>
               </a:rPr>
               <a:t>all</a:t>
@@ -4035,7 +4030,7 @@
             <a:r>
               <a:rPr lang="nl-NL" sz="1400" dirty="0">
                 <a:solidFill>
-                  <a:srgbClr val="00B0F0"/>
+                  <a:srgbClr val="FF0000"/>
                 </a:solidFill>
               </a:rPr>
               <a:t> files </a:t>
@@ -4043,7 +4038,7 @@
             <a:r>
               <a:rPr lang="nl-NL" sz="1400" dirty="0" err="1">
                 <a:solidFill>
-                  <a:srgbClr val="00B0F0"/>
+                  <a:srgbClr val="FF0000"/>
                 </a:solidFill>
               </a:rPr>
               <a:t>contained</a:t>
@@ -4051,7 +4046,7 @@
             <a:r>
               <a:rPr lang="nl-NL" sz="1400" dirty="0">
                 <a:solidFill>
-                  <a:srgbClr val="00B0F0"/>
+                  <a:srgbClr val="FF0000"/>
                 </a:solidFill>
               </a:rPr>
               <a:t> in </a:t>
@@ -4059,14 +4054,14 @@
             <a:r>
               <a:rPr lang="nl-NL" sz="1400" dirty="0" err="1">
                 <a:solidFill>
-                  <a:srgbClr val="00B0F0"/>
+                  <a:srgbClr val="FF0000"/>
                 </a:solidFill>
               </a:rPr>
               <a:t>that</a:t>
             </a:r>
             <a:endParaRPr lang="en-NL" sz="1400" dirty="0">
               <a:solidFill>
-                <a:srgbClr val="00B0F0"/>
+                <a:srgbClr val="FF0000"/>
               </a:solidFill>
             </a:endParaRPr>
           </a:p>
@@ -4097,7 +4092,7 @@
           </a:prstGeom>
           <a:ln w="19050">
             <a:solidFill>
-              <a:schemeClr val="accent5"/>
+              <a:srgbClr val="C00000"/>
             </a:solidFill>
             <a:tailEnd type="triangle"/>
           </a:ln>
@@ -4140,7 +4135,7 @@
           <a:noFill/>
           <a:ln>
             <a:solidFill>
-              <a:schemeClr val="accent5"/>
+              <a:srgbClr val="C00000"/>
             </a:solidFill>
           </a:ln>
         </p:spPr>
@@ -4153,7 +4148,7 @@
             <a:r>
               <a:rPr lang="nl-NL" sz="1400" dirty="0" err="1">
                 <a:solidFill>
-                  <a:srgbClr val="00B0F0"/>
+                  <a:srgbClr val="FF0000"/>
                 </a:solidFill>
               </a:rPr>
               <a:t>Installed</a:t>
@@ -4161,14 +4156,14 @@
             <a:r>
               <a:rPr lang="nl-NL" sz="1400" dirty="0">
                 <a:solidFill>
-                  <a:srgbClr val="00B0F0"/>
+                  <a:srgbClr val="FF0000"/>
                 </a:solidFill>
               </a:rPr>
               <a:t> packages</a:t>
             </a:r>
             <a:endParaRPr lang="en-NL" sz="1400" dirty="0">
               <a:solidFill>
-                <a:srgbClr val="00B0F0"/>
+                <a:srgbClr val="FF0000"/>
               </a:solidFill>
             </a:endParaRPr>
           </a:p>
@@ -4199,7 +4194,7 @@
           </a:prstGeom>
           <a:ln w="19050">
             <a:solidFill>
-              <a:schemeClr val="accent5"/>
+              <a:srgbClr val="C00000"/>
             </a:solidFill>
             <a:tailEnd type="triangle"/>
           </a:ln>
@@ -4242,7 +4237,7 @@
           <a:noFill/>
           <a:ln>
             <a:solidFill>
-              <a:schemeClr val="accent5"/>
+              <a:srgbClr val="C00000"/>
             </a:solidFill>
           </a:ln>
         </p:spPr>
@@ -4255,7 +4250,7 @@
             <a:r>
               <a:rPr lang="nl-NL" sz="1400" dirty="0">
                 <a:solidFill>
-                  <a:srgbClr val="00B0F0"/>
+                  <a:srgbClr val="FF0000"/>
                 </a:solidFill>
               </a:rPr>
               <a:t>Open a new:</a:t>
@@ -4265,7 +4260,7 @@
             <a:r>
               <a:rPr lang="nl-NL" sz="1400" dirty="0">
                 <a:solidFill>
-                  <a:srgbClr val="00B0F0"/>
+                  <a:srgbClr val="FF0000"/>
                 </a:solidFill>
               </a:rPr>
               <a:t>script</a:t>
@@ -4275,14 +4270,14 @@
             <a:r>
               <a:rPr lang="nl-NL" sz="1400" dirty="0" err="1">
                 <a:solidFill>
-                  <a:srgbClr val="00B0F0"/>
+                  <a:srgbClr val="FF0000"/>
                 </a:solidFill>
               </a:rPr>
               <a:t>Rmarkdown</a:t>
             </a:r>
             <a:endParaRPr lang="nl-NL" sz="1400" dirty="0">
               <a:solidFill>
-                <a:srgbClr val="00B0F0"/>
+                <a:srgbClr val="FF0000"/>
               </a:solidFill>
             </a:endParaRPr>
           </a:p>
@@ -4290,14 +4285,14 @@
             <a:r>
               <a:rPr lang="nl-NL" sz="1400" dirty="0" err="1">
                 <a:solidFill>
-                  <a:srgbClr val="00B0F0"/>
+                  <a:srgbClr val="FF0000"/>
                 </a:solidFill>
               </a:rPr>
               <a:t>Rpresentation</a:t>
             </a:r>
             <a:endParaRPr lang="nl-NL" sz="1400" dirty="0">
               <a:solidFill>
-                <a:srgbClr val="00B0F0"/>
+                <a:srgbClr val="FF0000"/>
               </a:solidFill>
             </a:endParaRPr>
           </a:p>
@@ -4305,7 +4300,7 @@
             <a:r>
               <a:rPr lang="nl-NL" sz="1400" dirty="0">
                 <a:solidFill>
-                  <a:srgbClr val="00B0F0"/>
+                  <a:srgbClr val="FF0000"/>
                 </a:solidFill>
               </a:rPr>
               <a:t>…</a:t>

</xml_diff>